<commit_message>
fixed getting when simplices appear
</commit_message>
<xml_diff>
--- a/various other files/project overview presentation.pptx
+++ b/various other files/project overview presentation.pptx
@@ -7103,9 +7103,16 @@
             <p:ph type="title"/>
           </p:nvPr>
         </p:nvSpPr>
-        <p:spPr/>
-        <p:txBody>
-          <a:bodyPr/>
+        <p:spPr>
+          <a:xfrm>
+            <a:off x="720000" y="340347"/>
+            <a:ext cx="7698022" cy="994172"/>
+          </a:xfrm>
+        </p:spPr>
+        <p:txBody>
+          <a:bodyPr anchor="b">
+            <a:normAutofit/>
+          </a:bodyPr>
           <a:lstStyle/>
           <a:p>
             <a:r>
@@ -7132,9 +7139,16 @@
             <p:ph idx="1"/>
           </p:nvPr>
         </p:nvSpPr>
-        <p:spPr/>
-        <p:txBody>
-          <a:bodyPr/>
+        <p:spPr>
+          <a:xfrm>
+            <a:off x="720000" y="1440873"/>
+            <a:ext cx="7698022" cy="2908103"/>
+          </a:xfrm>
+        </p:spPr>
+        <p:txBody>
+          <a:bodyPr>
+            <a:normAutofit/>
+          </a:bodyPr>
           <a:lstStyle/>
           <a:p>
             <a:r>
@@ -7221,12 +7235,7 @@
             <p:ph type="title"/>
           </p:nvPr>
         </p:nvSpPr>
-        <p:spPr>
-          <a:xfrm>
-            <a:off x="720000" y="340347"/>
-            <a:ext cx="7698022" cy="994172"/>
-          </a:xfrm>
-        </p:spPr>
+        <p:spPr/>
         <p:txBody>
           <a:bodyPr anchor="ctr">
             <a:normAutofit/>
@@ -7259,8 +7268,8 @@
         </p:nvSpPr>
         <p:spPr>
           <a:xfrm>
-            <a:off x="653511" y="1334519"/>
-            <a:ext cx="3915500" cy="2908103"/>
+            <a:off x="720000" y="1440873"/>
+            <a:ext cx="3849011" cy="2908103"/>
           </a:xfrm>
         </p:spPr>
         <p:txBody>
@@ -8428,6 +8437,14 @@
 <file path=ppt/slides/slide7.xml><?xml version="1.0" encoding="utf-8"?>
 <p:sld xmlns:a="http://schemas.openxmlformats.org/drawingml/2006/main" xmlns:r="http://schemas.openxmlformats.org/officeDocument/2006/relationships" xmlns:p="http://schemas.openxmlformats.org/presentationml/2006/main">
   <p:cSld>
+    <p:bg>
+      <p:bgPr>
+        <a:solidFill>
+          <a:schemeClr val="bg1"/>
+        </a:solidFill>
+        <a:effectLst/>
+      </p:bgPr>
+    </p:bg>
     <p:spTree>
       <p:nvGrpSpPr>
         <p:cNvPr id="1" name=""/>
@@ -8487,12 +8504,7 @@
             <p:ph idx="1"/>
           </p:nvPr>
         </p:nvSpPr>
-        <p:spPr>
-          <a:xfrm>
-            <a:off x="5007715" y="4014895"/>
-            <a:ext cx="3970314" cy="788257"/>
-          </a:xfrm>
-        </p:spPr>
+        <p:spPr/>
         <p:txBody>
           <a:bodyPr>
             <a:normAutofit/>

</xml_diff>